<commit_message>
Minor change to status update presentation for 11/2/2015
</commit_message>
<xml_diff>
--- a/StatusUpdatePresentation_20151102.pptx
+++ b/StatusUpdatePresentation_20151102.pptx
@@ -111,6 +111,22 @@
       </a:defRPr>
     </a:lvl9pPr>
   </p:defaultTextStyle>
+  <p:extLst>
+    <p:ext uri="{EFAFB233-063F-42B5-8137-9DF3F51BA10A}">
+      <p15:sldGuideLst xmlns:p15="http://schemas.microsoft.com/office/powerpoint/2012/main">
+        <p15:guide id="1" orient="horz" pos="2160">
+          <p15:clr>
+            <a:srgbClr val="A4A3A4"/>
+          </p15:clr>
+        </p15:guide>
+        <p15:guide id="2" pos="2880">
+          <p15:clr>
+            <a:srgbClr val="A4A3A4"/>
+          </p15:clr>
+        </p15:guide>
+      </p15:sldGuideLst>
+    </p:ext>
+  </p:extLst>
 </p:presentation>
 </file>
 
@@ -196,7 +212,7 @@
           <a:p>
             <a:fld id="{5E96229E-4BE2-484C-A716-0479D0737D16}" type="datetimeFigureOut">
               <a:rPr lang="en-US" smtClean="0"/>
-              <a:t>11/1/2015</a:t>
+              <a:t>11/2/2015</a:t>
             </a:fld>
             <a:endParaRPr lang="en-US"/>
           </a:p>
@@ -645,7 +661,7 @@
           <a:p>
             <a:fld id="{C4FC757A-F779-472C-82EE-95B3232F61DB}" type="datetime1">
               <a:rPr lang="en-US" smtClean="0"/>
-              <a:t>11/1/2015</a:t>
+              <a:t>11/2/2015</a:t>
             </a:fld>
             <a:endParaRPr lang="en-US"/>
           </a:p>
@@ -815,7 +831,7 @@
           <a:p>
             <a:fld id="{286229EC-97C8-4DB9-B907-06A23FF70D09}" type="datetime1">
               <a:rPr lang="en-US" smtClean="0"/>
-              <a:t>11/1/2015</a:t>
+              <a:t>11/2/2015</a:t>
             </a:fld>
             <a:endParaRPr lang="en-US"/>
           </a:p>
@@ -995,7 +1011,7 @@
           <a:p>
             <a:fld id="{A5CF3617-1A76-4134-80E2-1D58A698BC89}" type="datetime1">
               <a:rPr lang="en-US" smtClean="0"/>
-              <a:t>11/1/2015</a:t>
+              <a:t>11/2/2015</a:t>
             </a:fld>
             <a:endParaRPr lang="en-US"/>
           </a:p>
@@ -1165,7 +1181,7 @@
           <a:p>
             <a:fld id="{46B344B6-F247-44AC-BC14-076DC00BCBF1}" type="datetime1">
               <a:rPr lang="en-US" smtClean="0"/>
-              <a:t>11/1/2015</a:t>
+              <a:t>11/2/2015</a:t>
             </a:fld>
             <a:endParaRPr lang="en-US"/>
           </a:p>
@@ -1411,7 +1427,7 @@
           <a:p>
             <a:fld id="{5AFB3661-FD29-42F6-9AD4-DD6BFB99AC32}" type="datetime1">
               <a:rPr lang="en-US" smtClean="0"/>
-              <a:t>11/1/2015</a:t>
+              <a:t>11/2/2015</a:t>
             </a:fld>
             <a:endParaRPr lang="en-US"/>
           </a:p>
@@ -1699,7 +1715,7 @@
           <a:p>
             <a:fld id="{3A521023-D93E-43CD-829C-D44D21E05C32}" type="datetime1">
               <a:rPr lang="en-US" smtClean="0"/>
-              <a:t>11/1/2015</a:t>
+              <a:t>11/2/2015</a:t>
             </a:fld>
             <a:endParaRPr lang="en-US"/>
           </a:p>
@@ -2121,7 +2137,7 @@
           <a:p>
             <a:fld id="{F1E6D3C9-E2FC-4E88-86A6-441881CC53D0}" type="datetime1">
               <a:rPr lang="en-US" smtClean="0"/>
-              <a:t>11/1/2015</a:t>
+              <a:t>11/2/2015</a:t>
             </a:fld>
             <a:endParaRPr lang="en-US"/>
           </a:p>
@@ -2239,7 +2255,7 @@
           <a:p>
             <a:fld id="{8EC4D0A5-CD79-4475-B583-901544030512}" type="datetime1">
               <a:rPr lang="en-US" smtClean="0"/>
-              <a:t>11/1/2015</a:t>
+              <a:t>11/2/2015</a:t>
             </a:fld>
             <a:endParaRPr lang="en-US"/>
           </a:p>
@@ -2334,7 +2350,7 @@
           <a:p>
             <a:fld id="{04312032-80AE-4D1A-A3AF-F5EDC9490569}" type="datetime1">
               <a:rPr lang="en-US" smtClean="0"/>
-              <a:t>11/1/2015</a:t>
+              <a:t>11/2/2015</a:t>
             </a:fld>
             <a:endParaRPr lang="en-US"/>
           </a:p>
@@ -2611,7 +2627,7 @@
           <a:p>
             <a:fld id="{8B2BD2CA-4893-40B6-B1A5-141A1DE79159}" type="datetime1">
               <a:rPr lang="en-US" smtClean="0"/>
-              <a:t>11/1/2015</a:t>
+              <a:t>11/2/2015</a:t>
             </a:fld>
             <a:endParaRPr lang="en-US"/>
           </a:p>
@@ -2864,7 +2880,7 @@
           <a:p>
             <a:fld id="{8E51D940-9CAB-44FA-9143-E3A531EF0615}" type="datetime1">
               <a:rPr lang="en-US" smtClean="0"/>
-              <a:t>11/1/2015</a:t>
+              <a:t>11/2/2015</a:t>
             </a:fld>
             <a:endParaRPr lang="en-US"/>
           </a:p>
@@ -3077,7 +3093,7 @@
           <a:p>
             <a:fld id="{C4FA01B4-A97F-4E14-B967-31784AE54770}" type="datetime1">
               <a:rPr lang="en-US" smtClean="0"/>
-              <a:t>11/1/2015</a:t>
+              <a:t>11/2/2015</a:t>
             </a:fld>
             <a:endParaRPr lang="en-US"/>
           </a:p>
@@ -5337,8 +5353,59 @@
             <a:pPr lvl="1"/>
             <a:r>
               <a:rPr lang="en-US" sz="2000" dirty="0" smtClean="0"/>
-              <a:t>Fix lingering memory problems, UART</a:t>
-            </a:r>
+              <a:t>Fix lingering memory problems, </a:t>
+            </a:r>
+            <a:r>
+              <a:rPr lang="en-US" sz="2000" dirty="0" smtClean="0"/>
+              <a:t>UART</a:t>
+            </a:r>
+          </a:p>
+          <a:p>
+            <a:r>
+              <a:rPr lang="en-US" sz="2400" dirty="0" smtClean="0"/>
+              <a:t>Next</a:t>
+            </a:r>
+          </a:p>
+          <a:p>
+            <a:pPr lvl="1"/>
+            <a:r>
+              <a:rPr lang="en-US" sz="2000" dirty="0" smtClean="0"/>
+              <a:t>Superscalar </a:t>
+            </a:r>
+            <a:r>
+              <a:rPr lang="en-US" sz="2000" dirty="0" smtClean="0">
+                <a:sym typeface="Wingdings" panose="05000000000000000000" pitchFamily="2" charset="2"/>
+              </a:rPr>
+              <a:t> full </a:t>
+            </a:r>
+            <a:r>
+              <a:rPr lang="en-US" sz="2000" dirty="0" err="1" smtClean="0">
+                <a:sym typeface="Wingdings" panose="05000000000000000000" pitchFamily="2" charset="2"/>
+              </a:rPr>
+              <a:t>MorphCore</a:t>
+            </a:r>
+            <a:endParaRPr lang="en-US" sz="2000" dirty="0" smtClean="0">
+              <a:sym typeface="Wingdings" panose="05000000000000000000" pitchFamily="2" charset="2"/>
+            </a:endParaRPr>
+          </a:p>
+          <a:p>
+            <a:pPr lvl="1"/>
+            <a:r>
+              <a:rPr lang="en-US" sz="2000" dirty="0" smtClean="0">
+                <a:sym typeface="Wingdings" panose="05000000000000000000" pitchFamily="2" charset="2"/>
+              </a:rPr>
+              <a:t>Verification</a:t>
+            </a:r>
+          </a:p>
+          <a:p>
+            <a:pPr lvl="1"/>
+            <a:r>
+              <a:rPr lang="en-US" sz="2000" smtClean="0">
+                <a:sym typeface="Wingdings" panose="05000000000000000000" pitchFamily="2" charset="2"/>
+              </a:rPr>
+              <a:t>Demo programs</a:t>
+            </a:r>
+            <a:endParaRPr lang="en-US" sz="2000" dirty="0" smtClean="0"/>
           </a:p>
         </p:txBody>
       </p:sp>

</xml_diff>